<commit_message>
added qr codes and figures
</commit_message>
<xml_diff>
--- a/TransEvo_poster.pptx
+++ b/TransEvo_poster.pptx
@@ -208,7 +208,7 @@
           <a:p>
             <a:fld id="{25F9ADAF-5A26-0346-A251-6D9FF9546983}" type="datetimeFigureOut">
               <a:rPr lang="en-US" smtClean="0"/>
-              <a:t>10/5/19</a:t>
+              <a:t>10/7/19</a:t>
             </a:fld>
             <a:endParaRPr lang="en-US"/>
           </a:p>
@@ -690,7 +690,7 @@
           <a:p>
             <a:fld id="{74869837-E3B8-9344-85F7-CE0793C3741A}" type="datetimeFigureOut">
               <a:rPr lang="en-US" smtClean="0"/>
-              <a:t>10/5/19</a:t>
+              <a:t>10/7/19</a:t>
             </a:fld>
             <a:endParaRPr lang="en-US"/>
           </a:p>
@@ -860,7 +860,7 @@
           <a:p>
             <a:fld id="{74869837-E3B8-9344-85F7-CE0793C3741A}" type="datetimeFigureOut">
               <a:rPr lang="en-US" smtClean="0"/>
-              <a:t>10/5/19</a:t>
+              <a:t>10/7/19</a:t>
             </a:fld>
             <a:endParaRPr lang="en-US"/>
           </a:p>
@@ -1040,7 +1040,7 @@
           <a:p>
             <a:fld id="{74869837-E3B8-9344-85F7-CE0793C3741A}" type="datetimeFigureOut">
               <a:rPr lang="en-US" smtClean="0"/>
-              <a:t>10/5/19</a:t>
+              <a:t>10/7/19</a:t>
             </a:fld>
             <a:endParaRPr lang="en-US"/>
           </a:p>
@@ -1210,7 +1210,7 @@
           <a:p>
             <a:fld id="{74869837-E3B8-9344-85F7-CE0793C3741A}" type="datetimeFigureOut">
               <a:rPr lang="en-US" smtClean="0"/>
-              <a:t>10/5/19</a:t>
+              <a:t>10/7/19</a:t>
             </a:fld>
             <a:endParaRPr lang="en-US"/>
           </a:p>
@@ -1454,7 +1454,7 @@
           <a:p>
             <a:fld id="{74869837-E3B8-9344-85F7-CE0793C3741A}" type="datetimeFigureOut">
               <a:rPr lang="en-US" smtClean="0"/>
-              <a:t>10/5/19</a:t>
+              <a:t>10/7/19</a:t>
             </a:fld>
             <a:endParaRPr lang="en-US"/>
           </a:p>
@@ -1686,7 +1686,7 @@
           <a:p>
             <a:fld id="{74869837-E3B8-9344-85F7-CE0793C3741A}" type="datetimeFigureOut">
               <a:rPr lang="en-US" smtClean="0"/>
-              <a:t>10/5/19</a:t>
+              <a:t>10/7/19</a:t>
             </a:fld>
             <a:endParaRPr lang="en-US"/>
           </a:p>
@@ -2053,7 +2053,7 @@
           <a:p>
             <a:fld id="{74869837-E3B8-9344-85F7-CE0793C3741A}" type="datetimeFigureOut">
               <a:rPr lang="en-US" smtClean="0"/>
-              <a:t>10/5/19</a:t>
+              <a:t>10/7/19</a:t>
             </a:fld>
             <a:endParaRPr lang="en-US"/>
           </a:p>
@@ -2171,7 +2171,7 @@
           <a:p>
             <a:fld id="{74869837-E3B8-9344-85F7-CE0793C3741A}" type="datetimeFigureOut">
               <a:rPr lang="en-US" smtClean="0"/>
-              <a:t>10/5/19</a:t>
+              <a:t>10/7/19</a:t>
             </a:fld>
             <a:endParaRPr lang="en-US"/>
           </a:p>
@@ -2266,7 +2266,7 @@
           <a:p>
             <a:fld id="{74869837-E3B8-9344-85F7-CE0793C3741A}" type="datetimeFigureOut">
               <a:rPr lang="en-US" smtClean="0"/>
-              <a:t>10/5/19</a:t>
+              <a:t>10/7/19</a:t>
             </a:fld>
             <a:endParaRPr lang="en-US"/>
           </a:p>
@@ -2543,7 +2543,7 @@
           <a:p>
             <a:fld id="{74869837-E3B8-9344-85F7-CE0793C3741A}" type="datetimeFigureOut">
               <a:rPr lang="en-US" smtClean="0"/>
-              <a:t>10/5/19</a:t>
+              <a:t>10/7/19</a:t>
             </a:fld>
             <a:endParaRPr lang="en-US"/>
           </a:p>
@@ -2800,7 +2800,7 @@
           <a:p>
             <a:fld id="{74869837-E3B8-9344-85F7-CE0793C3741A}" type="datetimeFigureOut">
               <a:rPr lang="en-US" smtClean="0"/>
-              <a:t>10/5/19</a:t>
+              <a:t>10/7/19</a:t>
             </a:fld>
             <a:endParaRPr lang="en-US"/>
           </a:p>
@@ -3013,7 +3013,7 @@
           <a:p>
             <a:fld id="{74869837-E3B8-9344-85F7-CE0793C3741A}" type="datetimeFigureOut">
               <a:rPr lang="en-US" smtClean="0"/>
-              <a:t>10/5/19</a:t>
+              <a:t>10/7/19</a:t>
             </a:fld>
             <a:endParaRPr lang="en-US"/>
           </a:p>
@@ -3472,7 +3472,7 @@
                 </a:solidFill>
                 <a:latin typeface="Source Sans Pro" panose="020B0503030403020204" pitchFamily="34" charset="0"/>
               </a:rPr>
-              <a:t> saves leukemia patients during </a:t>
+              <a:t> may save leukemia patients during </a:t>
             </a:r>
             <a:r>
               <a:rPr lang="en-US" sz="1100" b="1" dirty="0">
@@ -3549,7 +3549,7 @@
                 </a:solidFill>
                 <a:latin typeface=""/>
               </a:rPr>
-              <a:t>Modelling dynamics of undetectable disease in leukemias concerning therapy.</a:t>
+              <a:t>Modeling dynamics of undetectable disease and therapy in leukemia</a:t>
             </a:r>
           </a:p>
         </p:txBody>
@@ -3612,10 +3612,10 @@
         </p:nvGrpSpPr>
         <p:grpSpPr>
           <a:xfrm>
-            <a:off x="2293362" y="647998"/>
-            <a:ext cx="576000" cy="72003"/>
+            <a:off x="1872000" y="647998"/>
+            <a:ext cx="1188000" cy="72003"/>
             <a:chOff x="2451363" y="750080"/>
-            <a:chExt cx="576000" cy="108005"/>
+            <a:chExt cx="1188000" cy="108005"/>
           </a:xfrm>
         </p:grpSpPr>
         <p:sp>
@@ -3633,7 +3633,7 @@
           <p:spPr>
             <a:xfrm>
               <a:off x="2451363" y="750086"/>
-              <a:ext cx="576000" cy="107999"/>
+              <a:ext cx="1188000" cy="107999"/>
             </a:xfrm>
             <a:prstGeom prst="rect">
               <a:avLst/>
@@ -3646,24 +3646,65 @@
             </a:bodyPr>
             <a:lstStyle/>
             <a:p>
-              <a:pPr algn="r"/>
               <a:r>
-                <a:rPr lang="en-US" sz="500" dirty="0">
+                <a:rPr lang="en-US" sz="400" b="1" dirty="0">
                   <a:solidFill>
                     <a:srgbClr val="3F3F3F"/>
                   </a:solidFill>
-                  <a:latin typeface=""/>
+                  <a:latin typeface="Source Sans Pro Light" panose="020B0403030403020204" pitchFamily="34" charset="0"/>
                 </a:rPr>
                 <a:t>Saumil Shah</a:t>
               </a:r>
+              <a:r>
+                <a:rPr lang="en-US" sz="400" dirty="0">
+                  <a:solidFill>
+                    <a:srgbClr val="3F3F3F"/>
+                  </a:solidFill>
+                  <a:latin typeface="Source Sans Pro Light" panose="020B0403030403020204" pitchFamily="34" charset="0"/>
+                </a:rPr>
+                <a:t>, Michael </a:t>
+              </a:r>
+              <a:r>
+                <a:rPr lang="en-US" sz="400" dirty="0" err="1">
+                  <a:solidFill>
+                    <a:srgbClr val="3F3F3F"/>
+                  </a:solidFill>
+                  <a:latin typeface="Source Sans Pro Light" panose="020B0403030403020204" pitchFamily="34" charset="0"/>
+                </a:rPr>
+                <a:t>Raatz</a:t>
+              </a:r>
+              <a:r>
+                <a:rPr lang="en-US" sz="400" dirty="0">
+                  <a:solidFill>
+                    <a:srgbClr val="3F3F3F"/>
+                  </a:solidFill>
+                  <a:latin typeface="Source Sans Pro Light" panose="020B0403030403020204" pitchFamily="34" charset="0"/>
+                </a:rPr>
+                <a:t>, Arne </a:t>
+              </a:r>
+              <a:r>
+                <a:rPr lang="en-US" sz="400" dirty="0" err="1">
+                  <a:solidFill>
+                    <a:srgbClr val="3F3F3F"/>
+                  </a:solidFill>
+                  <a:latin typeface="Source Sans Pro Light" panose="020B0403030403020204" pitchFamily="34" charset="0"/>
+                </a:rPr>
+                <a:t>Traulsen</a:t>
+              </a:r>
+              <a:endParaRPr lang="en-US" sz="400" dirty="0">
+                <a:solidFill>
+                  <a:srgbClr val="3F3F3F"/>
+                </a:solidFill>
+                <a:latin typeface="Source Sans Pro Light" panose="020B0403030403020204" pitchFamily="34" charset="0"/>
+              </a:endParaRPr>
             </a:p>
             <a:p>
-              <a:pPr algn="r"/>
               <a:r>
                 <a:rPr lang="en-US" sz="300" dirty="0" err="1">
                   <a:solidFill>
                     <a:srgbClr val="3F3F3F"/>
                   </a:solidFill>
+                  <a:latin typeface="Source Sans Pro Light" panose="020B0403030403020204" pitchFamily="34" charset="0"/>
                 </a:rPr>
                 <a:t>shah@evolbio.mpg.de</a:t>
               </a:r>
@@ -3671,6 +3712,7 @@
                 <a:solidFill>
                   <a:srgbClr val="3F3F3F"/>
                 </a:solidFill>
+                <a:latin typeface="Source Sans Pro Light" panose="020B0403030403020204" pitchFamily="34" charset="0"/>
               </a:endParaRPr>
             </a:p>
           </p:txBody>
@@ -3893,7 +3935,7 @@
         </p:nvGrpSpPr>
         <p:grpSpPr>
           <a:xfrm>
-            <a:off x="54640" y="594000"/>
+            <a:off x="0" y="594000"/>
             <a:ext cx="1734722" cy="180000"/>
             <a:chOff x="48959" y="732637"/>
             <a:chExt cx="1734722" cy="180000"/>
@@ -19469,7 +19511,7 @@
         </p:nvGrpSpPr>
         <p:grpSpPr>
           <a:xfrm>
-            <a:off x="1746000" y="1476000"/>
+            <a:off x="1746000" y="1458000"/>
             <a:ext cx="1152000" cy="1152000"/>
             <a:chOff x="1545456" y="1038467"/>
             <a:chExt cx="1296000" cy="1296000"/>
@@ -19705,7 +19747,7 @@
                 </a:solidFill>
                 <a:latin typeface="+mj-lt"/>
               </a:rPr>
-              <a:t>Series of specific lesions in white blood cell precursors leads to acute lymphoblastic leukemia (ALL).</a:t>
+              <a:t>A series of specific lesions in white blood cell precursors leads to acute lymphoblastic leukemia (ALL).</a:t>
             </a:r>
           </a:p>
           <a:p>
@@ -19735,7 +19777,7 @@
                 </a:solidFill>
                 <a:latin typeface="+mj-lt"/>
               </a:rPr>
-              <a:t>Primary treatment for ALL is chemotherapy, which combines anti-leukemic drugs targeting cell proliferation.</a:t>
+              <a:t>The primary treatment for ALL is chemotherapy, which combines anti-leukemic drugs targeting cell proliferation.</a:t>
             </a:r>
           </a:p>
           <a:p>
@@ -19762,7 +19804,7 @@
                 </a:solidFill>
                 <a:latin typeface="+mj-lt"/>
               </a:rPr>
-              <a:t>Most adults with ALL experience a relapse in the course of the treatment and disease doesn’t respond favorably to chemotherapy.</a:t>
+              <a:t>40%-50% of adults with ALL experience a relapse in the course of the treatment, and disease doesn’t respond favorably to chemotherapy.</a:t>
             </a:r>
           </a:p>
           <a:p>
@@ -19825,7 +19867,7 @@
                 </a:solidFill>
                 <a:latin typeface="+mj-lt"/>
               </a:rPr>
-              <a:t>Within 3 days of immunotherapy CD19+ cell counts drop below 1 cell/</a:t>
+              <a:t>Within 3 days of immunotherapy, CD19+ cell counts drop below 1 cell/</a:t>
             </a:r>
             <a:r>
               <a:rPr lang="en-US" sz="350" dirty="0" err="1">
@@ -19843,7 +19885,7 @@
                 </a:solidFill>
                 <a:latin typeface="+mj-lt"/>
               </a:rPr>
-              <a:t>; thus, the system is driven by random fluctuations.</a:t>
+              <a:t>; from whereon, the system is driven by stochastic fluctuations.</a:t>
             </a:r>
           </a:p>
           <a:p>
@@ -19877,7 +19919,7 @@
                 </a:solidFill>
                 <a:latin typeface="+mj-lt"/>
               </a:rPr>
-              <a:t>Formulate a stochastic model capturing randomness of the system.</a:t>
+              <a:t>Formulate a model capturing the stochasticity of the system.</a:t>
             </a:r>
           </a:p>
           <a:p>
@@ -19907,7 +19949,7 @@
                 </a:solidFill>
                 <a:latin typeface="+mj-lt"/>
               </a:rPr>
-              <a:t>Study effect of randomness on the treatment outcome.</a:t>
+              <a:t>Study effect of stochasticity on the treatment outcome.</a:t>
             </a:r>
           </a:p>
           <a:p>
@@ -19953,12 +19995,12 @@
         </p:nvPicPr>
         <p:blipFill rotWithShape="1">
           <a:blip r:embed="rId10"/>
-          <a:srcRect l="22500" t="6153" r="22500" b="63077"/>
+          <a:srcRect l="22409" t="6153" r="22590" b="63077"/>
           <a:stretch/>
         </p:blipFill>
         <p:spPr>
           <a:xfrm>
-            <a:off x="73308" y="2107463"/>
+            <a:off x="72000" y="2107463"/>
             <a:ext cx="792000" cy="576000"/>
           </a:xfrm>
           <a:prstGeom prst="rect">
@@ -20010,13 +20052,13 @@
           <p:nvPr/>
         </p:nvPicPr>
         <p:blipFill rotWithShape="1">
-          <a:blip r:embed="rId10"/>
+          <a:blip r:embed="rId12"/>
           <a:srcRect l="42072" t="76195" r="42072" b="21966"/>
           <a:stretch/>
         </p:blipFill>
         <p:spPr>
           <a:xfrm>
-            <a:off x="415308" y="2705063"/>
+            <a:off x="415308" y="2710800"/>
             <a:ext cx="360000" cy="54000"/>
           </a:xfrm>
           <a:prstGeom prst="rect">
@@ -20039,7 +20081,7 @@
           <p:nvPr/>
         </p:nvPicPr>
         <p:blipFill rotWithShape="1">
-          <a:blip r:embed="rId12"/>
+          <a:blip r:embed="rId13"/>
           <a:srcRect l="16086" t="8823" r="16086" b="52246"/>
           <a:stretch/>
         </p:blipFill>
@@ -20189,7 +20231,7 @@
         </p:nvGrpSpPr>
         <p:grpSpPr>
           <a:xfrm>
-            <a:off x="1746000" y="792001"/>
+            <a:off x="1746000" y="774000"/>
             <a:ext cx="1152000" cy="577499"/>
             <a:chOff x="1671414" y="1084214"/>
             <a:chExt cx="1296000" cy="649687"/>
@@ -20210,14 +20252,14 @@
             <p:nvPr/>
           </p:nvPicPr>
           <p:blipFill rotWithShape="1">
-            <a:blip r:embed="rId13"/>
-            <a:srcRect l="1463" t="3454" r="51245" b="61925"/>
+            <a:blip r:embed="rId14"/>
+            <a:srcRect l="1400" t="3463" r="51261" b="61905"/>
             <a:stretch/>
           </p:blipFill>
           <p:spPr>
             <a:xfrm>
-              <a:off x="2283414" y="1084214"/>
-              <a:ext cx="684000" cy="648000"/>
+              <a:off x="2282964" y="1084214"/>
+              <a:ext cx="684450" cy="647999"/>
             </a:xfrm>
             <a:prstGeom prst="rect">
               <a:avLst/>
@@ -20239,14 +20281,14 @@
             <p:nvPr/>
           </p:nvPicPr>
           <p:blipFill rotWithShape="1">
-            <a:blip r:embed="rId14"/>
-            <a:srcRect l="9212" t="6802" r="52735" b="62867"/>
+            <a:blip r:embed="rId15"/>
+            <a:srcRect l="9222" t="6861" r="52636" b="62815"/>
             <a:stretch/>
           </p:blipFill>
           <p:spPr>
             <a:xfrm>
               <a:off x="1671414" y="1084214"/>
-              <a:ext cx="630000" cy="649687"/>
+              <a:ext cx="631800" cy="649687"/>
             </a:xfrm>
             <a:prstGeom prst="rect">
               <a:avLst/>
@@ -20270,7 +20312,7 @@
         </p:nvGrpSpPr>
         <p:grpSpPr>
           <a:xfrm>
-            <a:off x="1746000" y="2772001"/>
+            <a:off x="1746000" y="2790000"/>
             <a:ext cx="1152000" cy="1151401"/>
             <a:chOff x="1672650" y="3024550"/>
             <a:chExt cx="1296000" cy="1295325"/>
@@ -20291,7 +20333,7 @@
             <p:nvPr/>
           </p:nvPicPr>
           <p:blipFill>
-            <a:blip r:embed="rId15"/>
+            <a:blip r:embed="rId16"/>
             <a:stretch>
               <a:fillRect/>
             </a:stretch>
@@ -20321,7 +20363,7 @@
             <p:nvPr/>
           </p:nvPicPr>
           <p:blipFill>
-            <a:blip r:embed="rId16"/>
+            <a:blip r:embed="rId17"/>
             <a:stretch>
               <a:fillRect/>
             </a:stretch>
@@ -20351,7 +20393,7 @@
             <p:nvPr/>
           </p:nvPicPr>
           <p:blipFill>
-            <a:blip r:embed="rId17"/>
+            <a:blip r:embed="rId18"/>
             <a:stretch>
               <a:fillRect/>
             </a:stretch>
@@ -20381,7 +20423,7 @@
             <p:nvPr/>
           </p:nvPicPr>
           <p:blipFill>
-            <a:blip r:embed="rId18"/>
+            <a:blip r:embed="rId19"/>
             <a:stretch>
               <a:fillRect/>
             </a:stretch>
@@ -20411,7 +20453,7 @@
             <p:nvPr/>
           </p:nvPicPr>
           <p:blipFill>
-            <a:blip r:embed="rId19"/>
+            <a:blip r:embed="rId20"/>
             <a:stretch>
               <a:fillRect/>
             </a:stretch>
@@ -20441,7 +20483,7 @@
             <p:nvPr/>
           </p:nvPicPr>
           <p:blipFill>
-            <a:blip r:embed="rId20"/>
+            <a:blip r:embed="rId21"/>
             <a:stretch>
               <a:fillRect/>
             </a:stretch>
@@ -20471,7 +20513,7 @@
             <p:nvPr/>
           </p:nvPicPr>
           <p:blipFill>
-            <a:blip r:embed="rId21"/>
+            <a:blip r:embed="rId22"/>
             <a:stretch>
               <a:fillRect/>
             </a:stretch>
@@ -20501,7 +20543,7 @@
             <p:nvPr/>
           </p:nvPicPr>
           <p:blipFill>
-            <a:blip r:embed="rId22"/>
+            <a:blip r:embed="rId23"/>
             <a:stretch>
               <a:fillRect/>
             </a:stretch>
@@ -20531,7 +20573,7 @@
             <p:nvPr/>
           </p:nvPicPr>
           <p:blipFill>
-            <a:blip r:embed="rId23"/>
+            <a:blip r:embed="rId24"/>
             <a:stretch>
               <a:fillRect/>
             </a:stretch>
@@ -20597,7 +20639,7 @@
                 </a:solidFill>
                 <a:latin typeface="+mj-lt"/>
               </a:rPr>
-              <a:t>Significant variation is observed in tumor cell numbers at the end of treatment</a:t>
+              <a:t>Tumor populations faced extinction that was subject to chance during treatment.</a:t>
             </a:r>
           </a:p>
           <a:p>
@@ -20612,7 +20654,7 @@
                 </a:solidFill>
                 <a:latin typeface="+mj-lt"/>
               </a:rPr>
-              <a:t>Tumor population faced extinction during treatment that were subject to chance</a:t>
+              <a:t>Significant variation was observed at the end of the treatment. </a:t>
             </a:r>
           </a:p>
           <a:p>
@@ -20627,7 +20669,7 @@
                 </a:solidFill>
                 <a:latin typeface="+mj-lt"/>
               </a:rPr>
-              <a:t>Differences in treatment outcome can lead to a broad diversity of post-treatment responses as tumor cell numbers, and the fraction of slow cells serve as an initial condition for a potential relapse.</a:t>
+              <a:t>Tumor cell numbers and fraction of slow cells are important initial conditions that shape the relapse, and differences in them can lead to diverse relapse profiles, generating within cohort variability.</a:t>
             </a:r>
           </a:p>
         </p:txBody>
@@ -20700,12 +20742,49 @@
           <a:lstStyle/>
           <a:p>
             <a:r>
-              <a:rPr lang="en-US" sz="200" dirty="0">
+              <a:rPr lang="en-US" sz="250" dirty="0">
                 <a:solidFill>
                   <a:srgbClr val="3F3F3F"/>
                 </a:solidFill>
+                <a:latin typeface="Source Sans Pro Light" panose="020B0403030403020204" pitchFamily="34" charset="0"/>
               </a:rPr>
-              <a:t>Figure 2: Simulations of chemotherapy and immunotherapy for ALL. Initial conditions are (S, F, Ta, Td) = (2000, 18000, 10, 1990). Panel titles report total tumor cells remaining at the end of the therapy. Panels (a) - (d) are single-cycle treatment simulations. Panels (a), (b) are chemotherapy, and panels (c), (d) are immunotherapy realizations. Panels (e), (f) are two-cycle realizations of immunotherapy.</a:t>
+              <a:t>Figure 2: Simulations of chemotherapy and immunotherapy for ALL. Initial conditions are (S, F, T</a:t>
+            </a:r>
+            <a:r>
+              <a:rPr lang="en-US" sz="250" baseline="-25000" dirty="0">
+                <a:solidFill>
+                  <a:srgbClr val="3F3F3F"/>
+                </a:solidFill>
+                <a:latin typeface="Source Sans Pro Light" panose="020B0403030403020204" pitchFamily="34" charset="0"/>
+              </a:rPr>
+              <a:t>a</a:t>
+            </a:r>
+            <a:r>
+              <a:rPr lang="en-US" sz="250" dirty="0">
+                <a:solidFill>
+                  <a:srgbClr val="3F3F3F"/>
+                </a:solidFill>
+                <a:latin typeface="Source Sans Pro Light" panose="020B0403030403020204" pitchFamily="34" charset="0"/>
+              </a:rPr>
+              <a:t>, T</a:t>
+            </a:r>
+            <a:r>
+              <a:rPr lang="en-US" sz="250" baseline="-25000" dirty="0">
+                <a:solidFill>
+                  <a:srgbClr val="3F3F3F"/>
+                </a:solidFill>
+                <a:latin typeface="Source Sans Pro Light" panose="020B0403030403020204" pitchFamily="34" charset="0"/>
+              </a:rPr>
+              <a:t>d</a:t>
+            </a:r>
+            <a:r>
+              <a:rPr lang="en-US" sz="250" dirty="0">
+                <a:solidFill>
+                  <a:srgbClr val="3F3F3F"/>
+                </a:solidFill>
+                <a:latin typeface="Source Sans Pro Light" panose="020B0403030403020204" pitchFamily="34" charset="0"/>
+              </a:rPr>
+              <a:t>) = (2000, 18000, 10, 1990). Panel titles report total tumor cells remaining at the end of the therapy. Panels (a) - (d) are single-cycle treatment simulations. Panels (a), (b) are chemotherapy, and panels (c), (d) are immunotherapy realizations. Panels (e), (f) are two-cycle realizations of immunotherapy.</a:t>
             </a:r>
           </a:p>
         </p:txBody>
@@ -20724,7 +20803,7 @@
         </p:nvSpPr>
         <p:spPr>
           <a:xfrm>
-            <a:off x="1656000" y="3906000"/>
+            <a:off x="1656000" y="3924000"/>
             <a:ext cx="1368000" cy="144000"/>
           </a:xfrm>
           <a:prstGeom prst="rect">
@@ -20739,74 +20818,83 @@
           <a:lstStyle/>
           <a:p>
             <a:r>
-              <a:rPr lang="en-US" sz="200" dirty="0">
+              <a:rPr lang="en-US" sz="250" dirty="0">
                 <a:solidFill>
                   <a:srgbClr val="3F3F3F"/>
                 </a:solidFill>
+                <a:latin typeface="Source Sans Pro Light" panose="020B0403030403020204" pitchFamily="34" charset="0"/>
               </a:rPr>
               <a:t>Figure 3: Numerical solutions of the Fokker-Planck equation. Panel titles report different time points. Initial conditions are </a:t>
             </a:r>
             <a:r>
-              <a:rPr lang="en-US" sz="200" dirty="0" err="1">
+              <a:rPr lang="en-US" sz="250" dirty="0" err="1">
                 <a:solidFill>
                   <a:srgbClr val="3F3F3F"/>
                 </a:solidFill>
+                <a:latin typeface="Source Sans Pro Light" panose="020B0403030403020204" pitchFamily="34" charset="0"/>
               </a:rPr>
               <a:t>Pr</a:t>
             </a:r>
             <a:r>
-              <a:rPr lang="en-US" sz="200" dirty="0">
+              <a:rPr lang="en-US" sz="250" dirty="0">
                 <a:solidFill>
                   <a:srgbClr val="3F3F3F"/>
                 </a:solidFill>
+                <a:latin typeface="Source Sans Pro Light" panose="020B0403030403020204" pitchFamily="34" charset="0"/>
               </a:rPr>
               <a:t>(S, F, 0) = </a:t>
             </a:r>
             <a:r>
-              <a:rPr lang="el-GR" sz="200" dirty="0">
+              <a:rPr lang="el-GR" sz="250" dirty="0">
                 <a:solidFill>
                   <a:srgbClr val="3F3F3F"/>
                 </a:solidFill>
+                <a:latin typeface="Source Sans Pro Light" panose="020B0403030403020204" pitchFamily="34" charset="0"/>
               </a:rPr>
               <a:t>δ(</a:t>
             </a:r>
             <a:r>
-              <a:rPr lang="en-US" sz="200" dirty="0">
+              <a:rPr lang="en-US" sz="250" dirty="0">
                 <a:solidFill>
                   <a:srgbClr val="3F3F3F"/>
                 </a:solidFill>
+                <a:latin typeface="Source Sans Pro Light" panose="020B0403030403020204" pitchFamily="34" charset="0"/>
               </a:rPr>
               <a:t>S − 20) </a:t>
             </a:r>
             <a:r>
-              <a:rPr lang="el-GR" sz="200" dirty="0">
+              <a:rPr lang="el-GR" sz="250" dirty="0">
                 <a:solidFill>
                   <a:srgbClr val="3F3F3F"/>
                 </a:solidFill>
+                <a:latin typeface="Source Sans Pro Light" panose="020B0403030403020204" pitchFamily="34" charset="0"/>
               </a:rPr>
               <a:t>δ(</a:t>
             </a:r>
             <a:r>
-              <a:rPr lang="en-US" sz="200" dirty="0">
+              <a:rPr lang="en-US" sz="250" dirty="0">
                 <a:solidFill>
                   <a:srgbClr val="3F3F3F"/>
                 </a:solidFill>
+                <a:latin typeface="Source Sans Pro Light" panose="020B0403030403020204" pitchFamily="34" charset="0"/>
               </a:rPr>
               <a:t>F − 20). Panels (a) - (f) correspond to the pre-therapy period. Panels (g) - (</a:t>
             </a:r>
             <a:r>
-              <a:rPr lang="en-US" sz="200" dirty="0" err="1">
+              <a:rPr lang="en-US" sz="250" dirty="0" err="1">
                 <a:solidFill>
                   <a:srgbClr val="3F3F3F"/>
                 </a:solidFill>
+                <a:latin typeface="Source Sans Pro Light" panose="020B0403030403020204" pitchFamily="34" charset="0"/>
               </a:rPr>
               <a:t>i</a:t>
             </a:r>
             <a:r>
-              <a:rPr lang="en-US" sz="200" dirty="0">
+              <a:rPr lang="en-US" sz="250" dirty="0">
                 <a:solidFill>
                   <a:srgbClr val="3F3F3F"/>
                 </a:solidFill>
+                <a:latin typeface="Source Sans Pro Light" panose="020B0403030403020204" pitchFamily="34" charset="0"/>
               </a:rPr>
               <a:t>) correspond to the chemotherapy period.</a:t>
             </a:r>
@@ -20827,8 +20915,8 @@
         </p:nvSpPr>
         <p:spPr>
           <a:xfrm>
-            <a:off x="1656000" y="1350000"/>
-            <a:ext cx="1368000" cy="144000"/>
+            <a:off x="1656000" y="1332000"/>
+            <a:ext cx="1350000" cy="144000"/>
           </a:xfrm>
           <a:prstGeom prst="rect">
             <a:avLst/>
@@ -20842,26 +20930,29 @@
           <a:lstStyle/>
           <a:p>
             <a:r>
-              <a:rPr lang="en-US" sz="200" dirty="0">
+              <a:rPr lang="en-US" sz="250" dirty="0">
                 <a:solidFill>
                   <a:srgbClr val="3F3F3F"/>
                 </a:solidFill>
+                <a:latin typeface="Source Sans Pro Light" panose="020B0403030403020204" pitchFamily="34" charset="0"/>
               </a:rPr>
               <a:t>Figure 1: The left panel summarizes the fundamental interactions of cell types with reaction rate constants depicted on the reaction arrows. The right panel shows a </a:t>
             </a:r>
             <a:r>
-              <a:rPr lang="en-US" sz="200" dirty="0" err="1">
+              <a:rPr lang="en-US" sz="250" dirty="0" err="1">
                 <a:solidFill>
                   <a:srgbClr val="3F3F3F"/>
                 </a:solidFill>
+                <a:latin typeface="Source Sans Pro Light" panose="020B0403030403020204" pitchFamily="34" charset="0"/>
               </a:rPr>
               <a:t>BlinatumoMAB</a:t>
             </a:r>
             <a:r>
-              <a:rPr lang="en-US" sz="200" dirty="0">
+              <a:rPr lang="en-US" sz="250" dirty="0">
                 <a:solidFill>
                   <a:srgbClr val="3F3F3F"/>
                 </a:solidFill>
+                <a:latin typeface="Source Sans Pro Light" panose="020B0403030403020204" pitchFamily="34" charset="0"/>
               </a:rPr>
               <a:t> activated T cell performing serial killing of tumor cells.</a:t>
             </a:r>
@@ -20971,7 +21062,7 @@
           <p:nvPr/>
         </p:nvPicPr>
         <p:blipFill>
-          <a:blip r:embed="rId24"/>
+          <a:blip r:embed="rId25"/>
           <a:stretch>
             <a:fillRect/>
           </a:stretch>
@@ -21054,7 +21145,7 @@
           <p:nvPr/>
         </p:nvPicPr>
         <p:blipFill>
-          <a:blip r:embed="rId25"/>
+          <a:blip r:embed="rId26"/>
           <a:stretch>
             <a:fillRect/>
           </a:stretch>

</xml_diff>